<commit_message>
on tap xu li anh
</commit_message>
<xml_diff>
--- a/Ung dung cong nghe ptpm/Bao cao/baocao (2).pptx
+++ b/Ung dung cong nghe ptpm/Bao cao/baocao (2).pptx
@@ -226,7 +226,7 @@
           <a:p>
             <a:fld id="{A3EDCD23-2DD8-4180-A9CC-4E448040504D}" type="datetimeFigureOut">
               <a:rPr lang="en-US" smtClean="0"/>
-              <a:t>8/6/2024</a:t>
+              <a:t>8/8/2024</a:t>
             </a:fld>
             <a:endParaRPr lang="en-US"/>
           </a:p>
@@ -4873,13 +4873,13 @@
   <p:clrMapOvr>
     <a:masterClrMapping/>
   </p:clrMapOvr>
-  <mc:AlternateContent xmlns:mc="http://schemas.openxmlformats.org/markup-compatibility/2006">
-    <mc:Choice xmlns:p14="http://schemas.microsoft.com/office/powerpoint/2010/main" Requires="p14">
+  <mc:AlternateContent xmlns:mc="http://schemas.openxmlformats.org/markup-compatibility/2006" xmlns:p14="http://schemas.microsoft.com/office/powerpoint/2010/main">
+    <mc:Choice Requires="p14">
       <p:transition spd="med" p14:dur="700">
         <p:fade/>
       </p:transition>
     </mc:Choice>
-    <mc:Fallback>
+    <mc:Fallback xmlns="">
       <p:transition spd="med">
         <p:fade/>
       </p:transition>
@@ -5050,13 +5050,13 @@
   <p:clrMapOvr>
     <a:masterClrMapping/>
   </p:clrMapOvr>
-  <mc:AlternateContent xmlns:mc="http://schemas.openxmlformats.org/markup-compatibility/2006">
-    <mc:Choice xmlns:p14="http://schemas.microsoft.com/office/powerpoint/2010/main" Requires="p14">
+  <mc:AlternateContent xmlns:mc="http://schemas.openxmlformats.org/markup-compatibility/2006" xmlns:p14="http://schemas.microsoft.com/office/powerpoint/2010/main">
+    <mc:Choice Requires="p14">
       <p:transition spd="med" p14:dur="700">
         <p:fade/>
       </p:transition>
     </mc:Choice>
-    <mc:Fallback>
+    <mc:Fallback xmlns="">
       <p:transition spd="med">
         <p:fade/>
       </p:transition>
@@ -8770,7 +8770,12 @@
             <p:ph idx="1"/>
           </p:nvPr>
         </p:nvSpPr>
-        <p:spPr/>
+        <p:spPr>
+          <a:xfrm>
+            <a:off x="0" y="726440"/>
+            <a:ext cx="9144000" cy="5000317"/>
+          </a:xfrm>
+        </p:spPr>
         <p:txBody>
           <a:bodyPr/>
           <a:lstStyle/>
@@ -8897,22 +8902,13 @@
               <a:buChar char=""/>
             </a:pPr>
             <a:r>
-              <a:rPr lang="en-US" sz="1400" dirty="0" err="1">
-                <a:effectLst/>
-                <a:latin typeface="Arial" panose="020B0604020202020204" pitchFamily="34" charset="0"/>
-                <a:ea typeface="Calibri" panose="020F0502020204030204" pitchFamily="34" charset="0"/>
-                <a:cs typeface="Arial" panose="020B0604020202020204" pitchFamily="34" charset="0"/>
-              </a:rPr>
-              <a:t>Hoàn</a:t>
-            </a:r>
-            <a:r>
               <a:rPr lang="en-US" sz="1400" dirty="0">
                 <a:effectLst/>
                 <a:latin typeface="Arial" panose="020B0604020202020204" pitchFamily="34" charset="0"/>
                 <a:ea typeface="Calibri" panose="020F0502020204030204" pitchFamily="34" charset="0"/>
                 <a:cs typeface="Arial" panose="020B0604020202020204" pitchFamily="34" charset="0"/>
               </a:rPr>
-              <a:t> </a:t>
+              <a:t>Hoàn </a:t>
             </a:r>
             <a:r>
               <a:rPr lang="en-US" sz="1400" dirty="0" err="1">
@@ -9774,7 +9770,71 @@
                 <a:ea typeface="Calibri" panose="020F0502020204030204" pitchFamily="34" charset="0"/>
                 <a:cs typeface="Arial" panose="020B0604020202020204" pitchFamily="34" charset="0"/>
               </a:rPr>
-              <a:t>  </a:t>
+              <a:t> </a:t>
+            </a:r>
+            <a:r>
+              <a:rPr lang="en-US" sz="1400" dirty="0" err="1">
+                <a:latin typeface="Arial" panose="020B0604020202020204" pitchFamily="34" charset="0"/>
+                <a:ea typeface="Calibri" panose="020F0502020204030204" pitchFamily="34" charset="0"/>
+                <a:cs typeface="Arial" panose="020B0604020202020204" pitchFamily="34" charset="0"/>
+              </a:rPr>
+              <a:t>của</a:t>
+            </a:r>
+            <a:r>
+              <a:rPr lang="en-US" sz="1400" dirty="0">
+                <a:latin typeface="Arial" panose="020B0604020202020204" pitchFamily="34" charset="0"/>
+                <a:ea typeface="Calibri" panose="020F0502020204030204" pitchFamily="34" charset="0"/>
+                <a:cs typeface="Arial" panose="020B0604020202020204" pitchFamily="34" charset="0"/>
+              </a:rPr>
+              <a:t> </a:t>
+            </a:r>
+            <a:r>
+              <a:rPr lang="en-US" sz="1400" dirty="0" err="1">
+                <a:latin typeface="Arial" panose="020B0604020202020204" pitchFamily="34" charset="0"/>
+                <a:ea typeface="Calibri" panose="020F0502020204030204" pitchFamily="34" charset="0"/>
+                <a:cs typeface="Arial" panose="020B0604020202020204" pitchFamily="34" charset="0"/>
+              </a:rPr>
+              <a:t>ứng</a:t>
+            </a:r>
+            <a:r>
+              <a:rPr lang="en-US" sz="1400" dirty="0">
+                <a:latin typeface="Arial" panose="020B0604020202020204" pitchFamily="34" charset="0"/>
+                <a:ea typeface="Calibri" panose="020F0502020204030204" pitchFamily="34" charset="0"/>
+                <a:cs typeface="Arial" panose="020B0604020202020204" pitchFamily="34" charset="0"/>
+              </a:rPr>
+              <a:t> </a:t>
+            </a:r>
+            <a:r>
+              <a:rPr lang="en-US" sz="1400" dirty="0" err="1">
+                <a:latin typeface="Arial" panose="020B0604020202020204" pitchFamily="34" charset="0"/>
+                <a:ea typeface="Calibri" panose="020F0502020204030204" pitchFamily="34" charset="0"/>
+                <a:cs typeface="Arial" panose="020B0604020202020204" pitchFamily="34" charset="0"/>
+              </a:rPr>
+              <a:t>dụng</a:t>
+            </a:r>
+            <a:r>
+              <a:rPr lang="en-US" sz="1400" dirty="0">
+                <a:latin typeface="Arial" panose="020B0604020202020204" pitchFamily="34" charset="0"/>
+                <a:ea typeface="Calibri" panose="020F0502020204030204" pitchFamily="34" charset="0"/>
+                <a:cs typeface="Arial" panose="020B0604020202020204" pitchFamily="34" charset="0"/>
+              </a:rPr>
+              <a:t> </a:t>
+            </a:r>
+            <a:r>
+              <a:rPr lang="en-US" sz="1400" dirty="0" err="1">
+                <a:latin typeface="Arial" panose="020B0604020202020204" pitchFamily="34" charset="0"/>
+                <a:ea typeface="Calibri" panose="020F0502020204030204" pitchFamily="34" charset="0"/>
+                <a:cs typeface="Arial" panose="020B0604020202020204" pitchFamily="34" charset="0"/>
+              </a:rPr>
+              <a:t>như</a:t>
+            </a:r>
+            <a:r>
+              <a:rPr lang="en-US" sz="1400" dirty="0">
+                <a:latin typeface="Arial" panose="020B0604020202020204" pitchFamily="34" charset="0"/>
+                <a:ea typeface="Calibri" panose="020F0502020204030204" pitchFamily="34" charset="0"/>
+                <a:cs typeface="Arial" panose="020B0604020202020204" pitchFamily="34" charset="0"/>
+              </a:rPr>
+              <a:t> </a:t>
             </a:r>
             <a:r>
               <a:rPr lang="en-US" sz="1400" dirty="0" err="1">
@@ -10061,13 +10121,189 @@
               <a:buChar char=""/>
             </a:pPr>
             <a:r>
+              <a:rPr lang="en-US" sz="1400" dirty="0">
+                <a:latin typeface="Arial" panose="020B0604020202020204" pitchFamily="34" charset="0"/>
+                <a:ea typeface="Calibri" panose="020F0502020204030204" pitchFamily="34" charset="0"/>
+                <a:cs typeface="Arial" panose="020B0604020202020204" pitchFamily="34" charset="0"/>
+              </a:rPr>
+              <a:t>T</a:t>
+            </a:r>
+            <a:r>
               <a:rPr lang="vi-VN" sz="1400" dirty="0">
                 <a:effectLst/>
                 <a:latin typeface="Arial" panose="020B0604020202020204" pitchFamily="34" charset="0"/>
                 <a:ea typeface="Calibri" panose="020F0502020204030204" pitchFamily="34" charset="0"/>
                 <a:cs typeface="Arial" panose="020B0604020202020204" pitchFamily="34" charset="0"/>
               </a:rPr>
-              <a:t>Đã thiết kế và triển khai giao diện người dùng thân thiện và dễ sử dụng.</a:t>
+              <a:t>hiết kế và triển khai </a:t>
+            </a:r>
+            <a:r>
+              <a:rPr lang="en-US" sz="1400" dirty="0" err="1">
+                <a:effectLst/>
+                <a:latin typeface="Arial" panose="020B0604020202020204" pitchFamily="34" charset="0"/>
+                <a:ea typeface="Calibri" panose="020F0502020204030204" pitchFamily="34" charset="0"/>
+                <a:cs typeface="Arial" panose="020B0604020202020204" pitchFamily="34" charset="0"/>
+              </a:rPr>
+              <a:t>đóng</a:t>
+            </a:r>
+            <a:r>
+              <a:rPr lang="en-US" sz="1400" dirty="0">
+                <a:effectLst/>
+                <a:latin typeface="Arial" panose="020B0604020202020204" pitchFamily="34" charset="0"/>
+                <a:ea typeface="Calibri" panose="020F0502020204030204" pitchFamily="34" charset="0"/>
+                <a:cs typeface="Arial" panose="020B0604020202020204" pitchFamily="34" charset="0"/>
+              </a:rPr>
+              <a:t> </a:t>
+            </a:r>
+            <a:r>
+              <a:rPr lang="en-US" sz="1400" dirty="0" err="1">
+                <a:effectLst/>
+                <a:latin typeface="Arial" panose="020B0604020202020204" pitchFamily="34" charset="0"/>
+                <a:ea typeface="Calibri" panose="020F0502020204030204" pitchFamily="34" charset="0"/>
+                <a:cs typeface="Arial" panose="020B0604020202020204" pitchFamily="34" charset="0"/>
+              </a:rPr>
+              <a:t>gói</a:t>
+            </a:r>
+            <a:r>
+              <a:rPr lang="en-US" sz="1400" dirty="0">
+                <a:effectLst/>
+                <a:latin typeface="Arial" panose="020B0604020202020204" pitchFamily="34" charset="0"/>
+                <a:ea typeface="Calibri" panose="020F0502020204030204" pitchFamily="34" charset="0"/>
+                <a:cs typeface="Arial" panose="020B0604020202020204" pitchFamily="34" charset="0"/>
+              </a:rPr>
+              <a:t> </a:t>
+            </a:r>
+            <a:r>
+              <a:rPr lang="en-US" sz="1400" dirty="0" err="1">
+                <a:effectLst/>
+                <a:latin typeface="Arial" panose="020B0604020202020204" pitchFamily="34" charset="0"/>
+                <a:ea typeface="Calibri" panose="020F0502020204030204" pitchFamily="34" charset="0"/>
+                <a:cs typeface="Arial" panose="020B0604020202020204" pitchFamily="34" charset="0"/>
+              </a:rPr>
+              <a:t>ứng</a:t>
+            </a:r>
+            <a:r>
+              <a:rPr lang="en-US" sz="1400" dirty="0">
+                <a:effectLst/>
+                <a:latin typeface="Arial" panose="020B0604020202020204" pitchFamily="34" charset="0"/>
+                <a:ea typeface="Calibri" panose="020F0502020204030204" pitchFamily="34" charset="0"/>
+                <a:cs typeface="Arial" panose="020B0604020202020204" pitchFamily="34" charset="0"/>
+              </a:rPr>
+              <a:t> </a:t>
+            </a:r>
+            <a:r>
+              <a:rPr lang="en-US" sz="1400" dirty="0" err="1">
+                <a:effectLst/>
+                <a:latin typeface="Arial" panose="020B0604020202020204" pitchFamily="34" charset="0"/>
+                <a:ea typeface="Calibri" panose="020F0502020204030204" pitchFamily="34" charset="0"/>
+                <a:cs typeface="Arial" panose="020B0604020202020204" pitchFamily="34" charset="0"/>
+              </a:rPr>
+              <a:t>dụng</a:t>
+            </a:r>
+            <a:r>
+              <a:rPr lang="en-US" sz="1400" dirty="0">
+                <a:latin typeface="Arial" panose="020B0604020202020204" pitchFamily="34" charset="0"/>
+                <a:ea typeface="Calibri" panose="020F0502020204030204" pitchFamily="34" charset="0"/>
+                <a:cs typeface="Arial" panose="020B0604020202020204" pitchFamily="34" charset="0"/>
+              </a:rPr>
+              <a:t> </a:t>
+            </a:r>
+            <a:r>
+              <a:rPr lang="en-US" sz="1400" dirty="0" err="1">
+                <a:latin typeface="Arial" panose="020B0604020202020204" pitchFamily="34" charset="0"/>
+                <a:ea typeface="Calibri" panose="020F0502020204030204" pitchFamily="34" charset="0"/>
+                <a:cs typeface="Arial" panose="020B0604020202020204" pitchFamily="34" charset="0"/>
+              </a:rPr>
+              <a:t>cho</a:t>
+            </a:r>
+            <a:r>
+              <a:rPr lang="en-US" sz="1400" dirty="0">
+                <a:latin typeface="Arial" panose="020B0604020202020204" pitchFamily="34" charset="0"/>
+                <a:ea typeface="Calibri" panose="020F0502020204030204" pitchFamily="34" charset="0"/>
+                <a:cs typeface="Arial" panose="020B0604020202020204" pitchFamily="34" charset="0"/>
+              </a:rPr>
+              <a:t> </a:t>
+            </a:r>
+            <a:r>
+              <a:rPr lang="en-US" sz="1400" dirty="0" err="1">
+                <a:latin typeface="Arial" panose="020B0604020202020204" pitchFamily="34" charset="0"/>
+                <a:ea typeface="Calibri" panose="020F0502020204030204" pitchFamily="34" charset="0"/>
+                <a:cs typeface="Arial" panose="020B0604020202020204" pitchFamily="34" charset="0"/>
+              </a:rPr>
+              <a:t>nhiều</a:t>
+            </a:r>
+            <a:r>
+              <a:rPr lang="en-US" sz="1400" dirty="0">
+                <a:latin typeface="Arial" panose="020B0604020202020204" pitchFamily="34" charset="0"/>
+                <a:ea typeface="Calibri" panose="020F0502020204030204" pitchFamily="34" charset="0"/>
+                <a:cs typeface="Arial" panose="020B0604020202020204" pitchFamily="34" charset="0"/>
+              </a:rPr>
+              <a:t> </a:t>
+            </a:r>
+            <a:r>
+              <a:rPr lang="en-US" sz="1400" dirty="0" err="1">
+                <a:latin typeface="Arial" panose="020B0604020202020204" pitchFamily="34" charset="0"/>
+                <a:ea typeface="Calibri" panose="020F0502020204030204" pitchFamily="34" charset="0"/>
+                <a:cs typeface="Arial" panose="020B0604020202020204" pitchFamily="34" charset="0"/>
+              </a:rPr>
+              <a:t>máy</a:t>
+            </a:r>
+            <a:r>
+              <a:rPr lang="en-US" sz="1400" dirty="0">
+                <a:latin typeface="Arial" panose="020B0604020202020204" pitchFamily="34" charset="0"/>
+                <a:ea typeface="Calibri" panose="020F0502020204030204" pitchFamily="34" charset="0"/>
+                <a:cs typeface="Arial" panose="020B0604020202020204" pitchFamily="34" charset="0"/>
+              </a:rPr>
+              <a:t> </a:t>
+            </a:r>
+            <a:r>
+              <a:rPr lang="en-US" sz="1400" dirty="0" err="1">
+                <a:latin typeface="Arial" panose="020B0604020202020204" pitchFamily="34" charset="0"/>
+                <a:ea typeface="Calibri" panose="020F0502020204030204" pitchFamily="34" charset="0"/>
+                <a:cs typeface="Arial" panose="020B0604020202020204" pitchFamily="34" charset="0"/>
+              </a:rPr>
+              <a:t>tính</a:t>
+            </a:r>
+            <a:r>
+              <a:rPr lang="en-US" sz="1400" dirty="0">
+                <a:latin typeface="Arial" panose="020B0604020202020204" pitchFamily="34" charset="0"/>
+                <a:ea typeface="Calibri" panose="020F0502020204030204" pitchFamily="34" charset="0"/>
+                <a:cs typeface="Arial" panose="020B0604020202020204" pitchFamily="34" charset="0"/>
+              </a:rPr>
+              <a:t> </a:t>
+            </a:r>
+            <a:r>
+              <a:rPr lang="en-US" sz="1400" dirty="0" err="1">
+                <a:latin typeface="Arial" panose="020B0604020202020204" pitchFamily="34" charset="0"/>
+                <a:ea typeface="Calibri" panose="020F0502020204030204" pitchFamily="34" charset="0"/>
+                <a:cs typeface="Arial" panose="020B0604020202020204" pitchFamily="34" charset="0"/>
+              </a:rPr>
+              <a:t>khác</a:t>
+            </a:r>
+            <a:r>
+              <a:rPr lang="en-US" sz="1400" dirty="0">
+                <a:latin typeface="Arial" panose="020B0604020202020204" pitchFamily="34" charset="0"/>
+                <a:ea typeface="Calibri" panose="020F0502020204030204" pitchFamily="34" charset="0"/>
+                <a:cs typeface="Arial" panose="020B0604020202020204" pitchFamily="34" charset="0"/>
+              </a:rPr>
+              <a:t> </a:t>
+            </a:r>
+            <a:r>
+              <a:rPr lang="en-US" sz="1400" dirty="0" err="1">
+                <a:latin typeface="Arial" panose="020B0604020202020204" pitchFamily="34" charset="0"/>
+                <a:ea typeface="Calibri" panose="020F0502020204030204" pitchFamily="34" charset="0"/>
+                <a:cs typeface="Arial" panose="020B0604020202020204" pitchFamily="34" charset="0"/>
+              </a:rPr>
+              <a:t>nhau</a:t>
+            </a:r>
+            <a:r>
+              <a:rPr lang="vi-VN" sz="1400" dirty="0">
+                <a:effectLst/>
+                <a:latin typeface="Arial" panose="020B0604020202020204" pitchFamily="34" charset="0"/>
+                <a:ea typeface="Calibri" panose="020F0502020204030204" pitchFamily="34" charset="0"/>
+                <a:cs typeface="Arial" panose="020B0604020202020204" pitchFamily="34" charset="0"/>
+              </a:rPr>
+              <a:t>.</a:t>
             </a:r>
             <a:endParaRPr lang="en-US" sz="1400" dirty="0">
               <a:effectLst/>
@@ -10094,7 +10330,7 @@
                 <a:ea typeface="Calibri" panose="020F0502020204030204" pitchFamily="34" charset="0"/>
                 <a:cs typeface="Arial" panose="020B0604020202020204" pitchFamily="34" charset="0"/>
               </a:rPr>
-              <a:t>Đã</a:t>
+              <a:t>Thực</a:t>
             </a:r>
             <a:r>
               <a:rPr lang="en-US" sz="1400" dirty="0">
@@ -10112,7 +10348,7 @@
                 <a:ea typeface="Calibri" panose="020F0502020204030204" pitchFamily="34" charset="0"/>
                 <a:cs typeface="Arial" panose="020B0604020202020204" pitchFamily="34" charset="0"/>
               </a:rPr>
-              <a:t>thực</a:t>
+              <a:t>hiện</a:t>
             </a:r>
             <a:r>
               <a:rPr lang="en-US" sz="1400" dirty="0">
@@ -10130,7 +10366,7 @@
                 <a:ea typeface="Calibri" panose="020F0502020204030204" pitchFamily="34" charset="0"/>
                 <a:cs typeface="Arial" panose="020B0604020202020204" pitchFamily="34" charset="0"/>
               </a:rPr>
-              <a:t>hiện</a:t>
+              <a:t>kiểm</a:t>
             </a:r>
             <a:r>
               <a:rPr lang="en-US" sz="1400" dirty="0">
@@ -10148,7 +10384,7 @@
                 <a:ea typeface="Calibri" panose="020F0502020204030204" pitchFamily="34" charset="0"/>
                 <a:cs typeface="Arial" panose="020B0604020202020204" pitchFamily="34" charset="0"/>
               </a:rPr>
-              <a:t>kiểm</a:t>
+              <a:t>thử</a:t>
             </a:r>
             <a:r>
               <a:rPr lang="en-US" sz="1400" dirty="0">
@@ -10161,16 +10397,14 @@
             </a:r>
             <a:r>
               <a:rPr lang="en-US" sz="1400" dirty="0" err="1">
-                <a:effectLst/>
-                <a:latin typeface="Arial" panose="020B0604020202020204" pitchFamily="34" charset="0"/>
-                <a:ea typeface="Calibri" panose="020F0502020204030204" pitchFamily="34" charset="0"/>
-                <a:cs typeface="Arial" panose="020B0604020202020204" pitchFamily="34" charset="0"/>
-              </a:rPr>
-              <a:t>thử</a:t>
+                <a:latin typeface="Arial" panose="020B0604020202020204" pitchFamily="34" charset="0"/>
+                <a:ea typeface="Calibri" panose="020F0502020204030204" pitchFamily="34" charset="0"/>
+                <a:cs typeface="Arial" panose="020B0604020202020204" pitchFamily="34" charset="0"/>
+              </a:rPr>
+              <a:t>các</a:t>
             </a:r>
             <a:r>
               <a:rPr lang="en-US" sz="1400" dirty="0">
-                <a:effectLst/>
                 <a:latin typeface="Arial" panose="020B0604020202020204" pitchFamily="34" charset="0"/>
                 <a:ea typeface="Calibri" panose="020F0502020204030204" pitchFamily="34" charset="0"/>
                 <a:cs typeface="Arial" panose="020B0604020202020204" pitchFamily="34" charset="0"/>
@@ -10179,16 +10413,14 @@
             </a:r>
             <a:r>
               <a:rPr lang="en-US" sz="1400" dirty="0" err="1">
-                <a:effectLst/>
-                <a:latin typeface="Arial" panose="020B0604020202020204" pitchFamily="34" charset="0"/>
-                <a:ea typeface="Calibri" panose="020F0502020204030204" pitchFamily="34" charset="0"/>
-                <a:cs typeface="Arial" panose="020B0604020202020204" pitchFamily="34" charset="0"/>
-              </a:rPr>
-              <a:t>hệ</a:t>
+                <a:latin typeface="Arial" panose="020B0604020202020204" pitchFamily="34" charset="0"/>
+                <a:ea typeface="Calibri" panose="020F0502020204030204" pitchFamily="34" charset="0"/>
+                <a:cs typeface="Arial" panose="020B0604020202020204" pitchFamily="34" charset="0"/>
+              </a:rPr>
+              <a:t>chức</a:t>
             </a:r>
             <a:r>
               <a:rPr lang="en-US" sz="1400" dirty="0">
-                <a:effectLst/>
                 <a:latin typeface="Arial" panose="020B0604020202020204" pitchFamily="34" charset="0"/>
                 <a:ea typeface="Calibri" panose="020F0502020204030204" pitchFamily="34" charset="0"/>
                 <a:cs typeface="Arial" panose="020B0604020202020204" pitchFamily="34" charset="0"/>
@@ -10197,16 +10429,14 @@
             </a:r>
             <a:r>
               <a:rPr lang="en-US" sz="1400" dirty="0" err="1">
-                <a:effectLst/>
-                <a:latin typeface="Arial" panose="020B0604020202020204" pitchFamily="34" charset="0"/>
-                <a:ea typeface="Calibri" panose="020F0502020204030204" pitchFamily="34" charset="0"/>
-                <a:cs typeface="Arial" panose="020B0604020202020204" pitchFamily="34" charset="0"/>
-              </a:rPr>
-              <a:t>thống</a:t>
+                <a:latin typeface="Arial" panose="020B0604020202020204" pitchFamily="34" charset="0"/>
+                <a:ea typeface="Calibri" panose="020F0502020204030204" pitchFamily="34" charset="0"/>
+                <a:cs typeface="Arial" panose="020B0604020202020204" pitchFamily="34" charset="0"/>
+              </a:rPr>
+              <a:t>năng</a:t>
             </a:r>
             <a:r>
               <a:rPr lang="en-US" sz="1400" dirty="0">
-                <a:effectLst/>
                 <a:latin typeface="Arial" panose="020B0604020202020204" pitchFamily="34" charset="0"/>
                 <a:ea typeface="Calibri" panose="020F0502020204030204" pitchFamily="34" charset="0"/>
                 <a:cs typeface="Arial" panose="020B0604020202020204" pitchFamily="34" charset="0"/>
@@ -10215,16 +10445,14 @@
             </a:r>
             <a:r>
               <a:rPr lang="en-US" sz="1400" dirty="0" err="1">
-                <a:effectLst/>
-                <a:latin typeface="Arial" panose="020B0604020202020204" pitchFamily="34" charset="0"/>
-                <a:ea typeface="Calibri" panose="020F0502020204030204" pitchFamily="34" charset="0"/>
-                <a:cs typeface="Arial" panose="020B0604020202020204" pitchFamily="34" charset="0"/>
-              </a:rPr>
-              <a:t>để</a:t>
+                <a:latin typeface="Arial" panose="020B0604020202020204" pitchFamily="34" charset="0"/>
+                <a:ea typeface="Calibri" panose="020F0502020204030204" pitchFamily="34" charset="0"/>
+                <a:cs typeface="Arial" panose="020B0604020202020204" pitchFamily="34" charset="0"/>
+              </a:rPr>
+              <a:t>khác</a:t>
             </a:r>
             <a:r>
               <a:rPr lang="en-US" sz="1400" dirty="0">
-                <a:effectLst/>
                 <a:latin typeface="Arial" panose="020B0604020202020204" pitchFamily="34" charset="0"/>
                 <a:ea typeface="Calibri" panose="020F0502020204030204" pitchFamily="34" charset="0"/>
                 <a:cs typeface="Arial" panose="020B0604020202020204" pitchFamily="34" charset="0"/>
@@ -10233,16 +10461,14 @@
             </a:r>
             <a:r>
               <a:rPr lang="en-US" sz="1400" dirty="0" err="1">
-                <a:effectLst/>
-                <a:latin typeface="Arial" panose="020B0604020202020204" pitchFamily="34" charset="0"/>
-                <a:ea typeface="Calibri" panose="020F0502020204030204" pitchFamily="34" charset="0"/>
-                <a:cs typeface="Arial" panose="020B0604020202020204" pitchFamily="34" charset="0"/>
-              </a:rPr>
-              <a:t>đảm</a:t>
+                <a:latin typeface="Arial" panose="020B0604020202020204" pitchFamily="34" charset="0"/>
+                <a:ea typeface="Calibri" panose="020F0502020204030204" pitchFamily="34" charset="0"/>
+                <a:cs typeface="Arial" panose="020B0604020202020204" pitchFamily="34" charset="0"/>
+              </a:rPr>
+              <a:t>nhau</a:t>
             </a:r>
             <a:r>
               <a:rPr lang="en-US" sz="1400" dirty="0">
-                <a:effectLst/>
                 <a:latin typeface="Arial" panose="020B0604020202020204" pitchFamily="34" charset="0"/>
                 <a:ea typeface="Calibri" panose="020F0502020204030204" pitchFamily="34" charset="0"/>
                 <a:cs typeface="Arial" panose="020B0604020202020204" pitchFamily="34" charset="0"/>
@@ -10251,16 +10477,14 @@
             </a:r>
             <a:r>
               <a:rPr lang="en-US" sz="1400" dirty="0" err="1">
-                <a:effectLst/>
-                <a:latin typeface="Arial" panose="020B0604020202020204" pitchFamily="34" charset="0"/>
-                <a:ea typeface="Calibri" panose="020F0502020204030204" pitchFamily="34" charset="0"/>
-                <a:cs typeface="Arial" panose="020B0604020202020204" pitchFamily="34" charset="0"/>
-              </a:rPr>
-              <a:t>bảo</a:t>
+                <a:latin typeface="Arial" panose="020B0604020202020204" pitchFamily="34" charset="0"/>
+                <a:ea typeface="Calibri" panose="020F0502020204030204" pitchFamily="34" charset="0"/>
+                <a:cs typeface="Arial" panose="020B0604020202020204" pitchFamily="34" charset="0"/>
+              </a:rPr>
+              <a:t>của</a:t>
             </a:r>
             <a:r>
               <a:rPr lang="en-US" sz="1400" dirty="0">
-                <a:effectLst/>
                 <a:latin typeface="Arial" panose="020B0604020202020204" pitchFamily="34" charset="0"/>
                 <a:ea typeface="Calibri" panose="020F0502020204030204" pitchFamily="34" charset="0"/>
                 <a:cs typeface="Arial" panose="020B0604020202020204" pitchFamily="34" charset="0"/>
@@ -10269,16 +10493,14 @@
             </a:r>
             <a:r>
               <a:rPr lang="en-US" sz="1400" dirty="0" err="1">
-                <a:effectLst/>
-                <a:latin typeface="Arial" panose="020B0604020202020204" pitchFamily="34" charset="0"/>
-                <a:ea typeface="Calibri" panose="020F0502020204030204" pitchFamily="34" charset="0"/>
-                <a:cs typeface="Arial" panose="020B0604020202020204" pitchFamily="34" charset="0"/>
-              </a:rPr>
-              <a:t>các</a:t>
+                <a:latin typeface="Arial" panose="020B0604020202020204" pitchFamily="34" charset="0"/>
+                <a:ea typeface="Calibri" panose="020F0502020204030204" pitchFamily="34" charset="0"/>
+                <a:cs typeface="Arial" panose="020B0604020202020204" pitchFamily="34" charset="0"/>
+              </a:rPr>
+              <a:t>ứng</a:t>
             </a:r>
             <a:r>
               <a:rPr lang="en-US" sz="1400" dirty="0">
-                <a:effectLst/>
                 <a:latin typeface="Arial" panose="020B0604020202020204" pitchFamily="34" charset="0"/>
                 <a:ea typeface="Calibri" panose="020F0502020204030204" pitchFamily="34" charset="0"/>
                 <a:cs typeface="Arial" panose="020B0604020202020204" pitchFamily="34" charset="0"/>
@@ -10287,138 +10509,11 @@
             </a:r>
             <a:r>
               <a:rPr lang="en-US" sz="1400" dirty="0" err="1">
-                <a:effectLst/>
-                <a:latin typeface="Arial" panose="020B0604020202020204" pitchFamily="34" charset="0"/>
-                <a:ea typeface="Calibri" panose="020F0502020204030204" pitchFamily="34" charset="0"/>
-                <a:cs typeface="Arial" panose="020B0604020202020204" pitchFamily="34" charset="0"/>
-              </a:rPr>
-              <a:t>chức</a:t>
-            </a:r>
-            <a:r>
-              <a:rPr lang="en-US" sz="1400" dirty="0">
-                <a:effectLst/>
-                <a:latin typeface="Arial" panose="020B0604020202020204" pitchFamily="34" charset="0"/>
-                <a:ea typeface="Calibri" panose="020F0502020204030204" pitchFamily="34" charset="0"/>
-                <a:cs typeface="Arial" panose="020B0604020202020204" pitchFamily="34" charset="0"/>
-              </a:rPr>
-              <a:t> </a:t>
-            </a:r>
-            <a:r>
-              <a:rPr lang="en-US" sz="1400" dirty="0" err="1">
-                <a:effectLst/>
-                <a:latin typeface="Arial" panose="020B0604020202020204" pitchFamily="34" charset="0"/>
-                <a:ea typeface="Calibri" panose="020F0502020204030204" pitchFamily="34" charset="0"/>
-                <a:cs typeface="Arial" panose="020B0604020202020204" pitchFamily="34" charset="0"/>
-              </a:rPr>
-              <a:t>năng</a:t>
-            </a:r>
-            <a:r>
-              <a:rPr lang="en-US" sz="1400" dirty="0">
-                <a:effectLst/>
-                <a:latin typeface="Arial" panose="020B0604020202020204" pitchFamily="34" charset="0"/>
-                <a:ea typeface="Calibri" panose="020F0502020204030204" pitchFamily="34" charset="0"/>
-                <a:cs typeface="Arial" panose="020B0604020202020204" pitchFamily="34" charset="0"/>
-              </a:rPr>
-              <a:t> </a:t>
-            </a:r>
-            <a:r>
-              <a:rPr lang="en-US" sz="1400" dirty="0" err="1">
-                <a:effectLst/>
-                <a:latin typeface="Arial" panose="020B0604020202020204" pitchFamily="34" charset="0"/>
-                <a:ea typeface="Calibri" panose="020F0502020204030204" pitchFamily="34" charset="0"/>
-                <a:cs typeface="Arial" panose="020B0604020202020204" pitchFamily="34" charset="0"/>
-              </a:rPr>
-              <a:t>hoạt</a:t>
-            </a:r>
-            <a:r>
-              <a:rPr lang="en-US" sz="1400" dirty="0">
-                <a:effectLst/>
-                <a:latin typeface="Arial" panose="020B0604020202020204" pitchFamily="34" charset="0"/>
-                <a:ea typeface="Calibri" panose="020F0502020204030204" pitchFamily="34" charset="0"/>
-                <a:cs typeface="Arial" panose="020B0604020202020204" pitchFamily="34" charset="0"/>
-              </a:rPr>
-              <a:t> </a:t>
-            </a:r>
-            <a:r>
-              <a:rPr lang="en-US" sz="1400" dirty="0" err="1">
-                <a:effectLst/>
-                <a:latin typeface="Arial" panose="020B0604020202020204" pitchFamily="34" charset="0"/>
-                <a:ea typeface="Calibri" panose="020F0502020204030204" pitchFamily="34" charset="0"/>
-                <a:cs typeface="Arial" panose="020B0604020202020204" pitchFamily="34" charset="0"/>
-              </a:rPr>
-              <a:t>động</a:t>
-            </a:r>
-            <a:r>
-              <a:rPr lang="en-US" sz="1400" dirty="0">
-                <a:effectLst/>
-                <a:latin typeface="Arial" panose="020B0604020202020204" pitchFamily="34" charset="0"/>
-                <a:ea typeface="Calibri" panose="020F0502020204030204" pitchFamily="34" charset="0"/>
-                <a:cs typeface="Arial" panose="020B0604020202020204" pitchFamily="34" charset="0"/>
-              </a:rPr>
-              <a:t> </a:t>
-            </a:r>
-            <a:r>
-              <a:rPr lang="en-US" sz="1400" dirty="0" err="1">
-                <a:effectLst/>
-                <a:latin typeface="Arial" panose="020B0604020202020204" pitchFamily="34" charset="0"/>
-                <a:ea typeface="Calibri" panose="020F0502020204030204" pitchFamily="34" charset="0"/>
-                <a:cs typeface="Arial" panose="020B0604020202020204" pitchFamily="34" charset="0"/>
-              </a:rPr>
-              <a:t>đúng</a:t>
-            </a:r>
-            <a:r>
-              <a:rPr lang="en-US" sz="1400" dirty="0">
-                <a:effectLst/>
-                <a:latin typeface="Arial" panose="020B0604020202020204" pitchFamily="34" charset="0"/>
-                <a:ea typeface="Calibri" panose="020F0502020204030204" pitchFamily="34" charset="0"/>
-                <a:cs typeface="Arial" panose="020B0604020202020204" pitchFamily="34" charset="0"/>
-              </a:rPr>
-              <a:t> </a:t>
-            </a:r>
-            <a:r>
-              <a:rPr lang="en-US" sz="1400" dirty="0" err="1">
-                <a:effectLst/>
-                <a:latin typeface="Arial" panose="020B0604020202020204" pitchFamily="34" charset="0"/>
-                <a:ea typeface="Calibri" panose="020F0502020204030204" pitchFamily="34" charset="0"/>
-                <a:cs typeface="Arial" panose="020B0604020202020204" pitchFamily="34" charset="0"/>
-              </a:rPr>
-              <a:t>theo</a:t>
-            </a:r>
-            <a:r>
-              <a:rPr lang="en-US" sz="1400" dirty="0">
-                <a:effectLst/>
-                <a:latin typeface="Arial" panose="020B0604020202020204" pitchFamily="34" charset="0"/>
-                <a:ea typeface="Calibri" panose="020F0502020204030204" pitchFamily="34" charset="0"/>
-                <a:cs typeface="Arial" panose="020B0604020202020204" pitchFamily="34" charset="0"/>
-              </a:rPr>
-              <a:t> </a:t>
-            </a:r>
-            <a:r>
-              <a:rPr lang="en-US" sz="1400" dirty="0" err="1">
-                <a:effectLst/>
-                <a:latin typeface="Arial" panose="020B0604020202020204" pitchFamily="34" charset="0"/>
-                <a:ea typeface="Calibri" panose="020F0502020204030204" pitchFamily="34" charset="0"/>
-                <a:cs typeface="Arial" panose="020B0604020202020204" pitchFamily="34" charset="0"/>
-              </a:rPr>
-              <a:t>yêu</a:t>
-            </a:r>
-            <a:r>
-              <a:rPr lang="en-US" sz="1400" dirty="0">
-                <a:effectLst/>
-                <a:latin typeface="Arial" panose="020B0604020202020204" pitchFamily="34" charset="0"/>
-                <a:ea typeface="Calibri" panose="020F0502020204030204" pitchFamily="34" charset="0"/>
-                <a:cs typeface="Arial" panose="020B0604020202020204" pitchFamily="34" charset="0"/>
-              </a:rPr>
-              <a:t> </a:t>
-            </a:r>
-            <a:r>
-              <a:rPr lang="en-US" sz="1400" dirty="0" err="1">
-                <a:effectLst/>
-                <a:latin typeface="Arial" panose="020B0604020202020204" pitchFamily="34" charset="0"/>
-                <a:ea typeface="Calibri" panose="020F0502020204030204" pitchFamily="34" charset="0"/>
-                <a:cs typeface="Arial" panose="020B0604020202020204" pitchFamily="34" charset="0"/>
-              </a:rPr>
-              <a:t>cầu</a:t>
+                <a:latin typeface="Arial" panose="020B0604020202020204" pitchFamily="34" charset="0"/>
+                <a:ea typeface="Calibri" panose="020F0502020204030204" pitchFamily="34" charset="0"/>
+                <a:cs typeface="Arial" panose="020B0604020202020204" pitchFamily="34" charset="0"/>
+              </a:rPr>
+              <a:t>dụng</a:t>
             </a:r>
             <a:r>
               <a:rPr lang="en-US" sz="1400" dirty="0">
@@ -10568,7 +10663,7 @@
                 <a:ea typeface="Calibri" panose="020F0502020204030204" pitchFamily="34" charset="0"/>
                 <a:cs typeface="Arial" panose="020B0604020202020204" pitchFamily="34" charset="0"/>
               </a:rPr>
-              <a:t>Việc kiểm thử hệ thống chưa được thực hiện toàn diện, có thể còn tồn tại một số lỗi nhỏ.</a:t>
+              <a:t>Việc kiểm thử chưa được thực hiện toàn diện, có thể còn tồn tại một số lỗi nhỏ.</a:t>
             </a:r>
             <a:endParaRPr lang="en-US" sz="1400" dirty="0">
               <a:effectLst/>
@@ -10675,7 +10770,7 @@
                 <a:latin typeface="Arial" panose="020B0604020202020204" pitchFamily="34" charset="0"/>
                 <a:cs typeface="Arial" panose="020B0604020202020204" pitchFamily="34" charset="0"/>
               </a:rPr>
-              <a:t>tài</a:t>
+              <a:t>khách</a:t>
             </a:r>
             <a:r>
               <a:rPr lang="en-US" sz="1400" dirty="0">
@@ -10689,7 +10784,7 @@
                 <a:latin typeface="Arial" panose="020B0604020202020204" pitchFamily="34" charset="0"/>
                 <a:cs typeface="Arial" panose="020B0604020202020204" pitchFamily="34" charset="0"/>
               </a:rPr>
-              <a:t>chính</a:t>
+              <a:t>hàng</a:t>
             </a:r>
             <a:r>
               <a:rPr lang="en-US" sz="1400" dirty="0">
@@ -10703,7 +10798,7 @@
                 <a:latin typeface="Arial" panose="020B0604020202020204" pitchFamily="34" charset="0"/>
                 <a:cs typeface="Arial" panose="020B0604020202020204" pitchFamily="34" charset="0"/>
               </a:rPr>
-              <a:t>thống</a:t>
+              <a:t>hoá</a:t>
             </a:r>
             <a:r>
               <a:rPr lang="en-US" sz="1400" dirty="0">
@@ -10717,35 +10812,7 @@
                 <a:latin typeface="Arial" panose="020B0604020202020204" pitchFamily="34" charset="0"/>
                 <a:cs typeface="Arial" panose="020B0604020202020204" pitchFamily="34" charset="0"/>
               </a:rPr>
-              <a:t>kê</a:t>
-            </a:r>
-            <a:r>
-              <a:rPr lang="en-US" sz="1400" dirty="0">
-                <a:latin typeface="Arial" panose="020B0604020202020204" pitchFamily="34" charset="0"/>
-                <a:cs typeface="Arial" panose="020B0604020202020204" pitchFamily="34" charset="0"/>
-              </a:rPr>
-              <a:t> </a:t>
-            </a:r>
-            <a:r>
-              <a:rPr lang="en-US" sz="1400" dirty="0" err="1">
-                <a:latin typeface="Arial" panose="020B0604020202020204" pitchFamily="34" charset="0"/>
-                <a:cs typeface="Arial" panose="020B0604020202020204" pitchFamily="34" charset="0"/>
-              </a:rPr>
-              <a:t>tài</a:t>
-            </a:r>
-            <a:r>
-              <a:rPr lang="en-US" sz="1400" dirty="0">
-                <a:latin typeface="Arial" panose="020B0604020202020204" pitchFamily="34" charset="0"/>
-                <a:cs typeface="Arial" panose="020B0604020202020204" pitchFamily="34" charset="0"/>
-              </a:rPr>
-              <a:t> </a:t>
-            </a:r>
-            <a:r>
-              <a:rPr lang="en-US" sz="1400" dirty="0" err="1">
-                <a:latin typeface="Arial" panose="020B0604020202020204" pitchFamily="34" charset="0"/>
-                <a:cs typeface="Arial" panose="020B0604020202020204" pitchFamily="34" charset="0"/>
-              </a:rPr>
-              <a:t>chính</a:t>
+              <a:t>đơn</a:t>
             </a:r>
             <a:r>
               <a:rPr lang="en-US" sz="1400" dirty="0">
@@ -10771,7 +10838,7 @@
                 <a:latin typeface="Arial" panose="020B0604020202020204" pitchFamily="34" charset="0"/>
                 <a:cs typeface="Arial" panose="020B0604020202020204" pitchFamily="34" charset="0"/>
               </a:rPr>
-              <a:t>Thực</a:t>
+              <a:t>Rà</a:t>
             </a:r>
             <a:r>
               <a:rPr lang="en-US" sz="1400" dirty="0">
@@ -10785,6 +10852,90 @@
                 <a:latin typeface="Arial" panose="020B0604020202020204" pitchFamily="34" charset="0"/>
                 <a:cs typeface="Arial" panose="020B0604020202020204" pitchFamily="34" charset="0"/>
               </a:rPr>
+              <a:t>soát</a:t>
+            </a:r>
+            <a:r>
+              <a:rPr lang="en-US" sz="1400" dirty="0">
+                <a:latin typeface="Arial" panose="020B0604020202020204" pitchFamily="34" charset="0"/>
+                <a:cs typeface="Arial" panose="020B0604020202020204" pitchFamily="34" charset="0"/>
+              </a:rPr>
+              <a:t> </a:t>
+            </a:r>
+            <a:r>
+              <a:rPr lang="en-US" sz="1400" dirty="0" err="1">
+                <a:latin typeface="Arial" panose="020B0604020202020204" pitchFamily="34" charset="0"/>
+                <a:cs typeface="Arial" panose="020B0604020202020204" pitchFamily="34" charset="0"/>
+              </a:rPr>
+              <a:t>kiểm</a:t>
+            </a:r>
+            <a:r>
+              <a:rPr lang="en-US" sz="1400" dirty="0">
+                <a:latin typeface="Arial" panose="020B0604020202020204" pitchFamily="34" charset="0"/>
+                <a:cs typeface="Arial" panose="020B0604020202020204" pitchFamily="34" charset="0"/>
+              </a:rPr>
+              <a:t> </a:t>
+            </a:r>
+            <a:r>
+              <a:rPr lang="en-US" sz="1400" dirty="0" err="1">
+                <a:latin typeface="Arial" panose="020B0604020202020204" pitchFamily="34" charset="0"/>
+                <a:cs typeface="Arial" panose="020B0604020202020204" pitchFamily="34" charset="0"/>
+              </a:rPr>
+              <a:t>thử</a:t>
+            </a:r>
+            <a:r>
+              <a:rPr lang="en-US" sz="1400" dirty="0">
+                <a:latin typeface="Arial" panose="020B0604020202020204" pitchFamily="34" charset="0"/>
+                <a:cs typeface="Arial" panose="020B0604020202020204" pitchFamily="34" charset="0"/>
+              </a:rPr>
+              <a:t> </a:t>
+            </a:r>
+            <a:r>
+              <a:rPr lang="en-US" sz="1400" dirty="0" err="1">
+                <a:latin typeface="Arial" panose="020B0604020202020204" pitchFamily="34" charset="0"/>
+                <a:cs typeface="Arial" panose="020B0604020202020204" pitchFamily="34" charset="0"/>
+              </a:rPr>
+              <a:t>các</a:t>
+            </a:r>
+            <a:r>
+              <a:rPr lang="en-US" sz="1400" dirty="0">
+                <a:latin typeface="Arial" panose="020B0604020202020204" pitchFamily="34" charset="0"/>
+                <a:cs typeface="Arial" panose="020B0604020202020204" pitchFamily="34" charset="0"/>
+              </a:rPr>
+              <a:t> </a:t>
+            </a:r>
+            <a:r>
+              <a:rPr lang="en-US" sz="1400" dirty="0" err="1">
+                <a:latin typeface="Arial" panose="020B0604020202020204" pitchFamily="34" charset="0"/>
+                <a:cs typeface="Arial" panose="020B0604020202020204" pitchFamily="34" charset="0"/>
+              </a:rPr>
+              <a:t>chức</a:t>
+            </a:r>
+            <a:r>
+              <a:rPr lang="en-US" sz="1400" dirty="0">
+                <a:latin typeface="Arial" panose="020B0604020202020204" pitchFamily="34" charset="0"/>
+                <a:cs typeface="Arial" panose="020B0604020202020204" pitchFamily="34" charset="0"/>
+              </a:rPr>
+              <a:t> </a:t>
+            </a:r>
+            <a:r>
+              <a:rPr lang="en-US" sz="1400" dirty="0" err="1">
+                <a:latin typeface="Arial" panose="020B0604020202020204" pitchFamily="34" charset="0"/>
+                <a:cs typeface="Arial" panose="020B0604020202020204" pitchFamily="34" charset="0"/>
+              </a:rPr>
+              <a:t>năng</a:t>
+            </a:r>
+            <a:r>
+              <a:rPr lang="en-US" sz="1400" dirty="0">
+                <a:latin typeface="Arial" panose="020B0604020202020204" pitchFamily="34" charset="0"/>
+                <a:cs typeface="Arial" panose="020B0604020202020204" pitchFamily="34" charset="0"/>
+              </a:rPr>
+              <a:t> </a:t>
+            </a:r>
+            <a:r>
+              <a:rPr lang="en-US" sz="1400" dirty="0" err="1">
+                <a:latin typeface="Arial" panose="020B0604020202020204" pitchFamily="34" charset="0"/>
+                <a:cs typeface="Arial" panose="020B0604020202020204" pitchFamily="34" charset="0"/>
+              </a:rPr>
               <a:t>hiện</a:t>
             </a:r>
             <a:r>
@@ -10799,6 +10950,62 @@
                 <a:latin typeface="Arial" panose="020B0604020202020204" pitchFamily="34" charset="0"/>
                 <a:cs typeface="Arial" panose="020B0604020202020204" pitchFamily="34" charset="0"/>
               </a:rPr>
+              <a:t>tại</a:t>
+            </a:r>
+            <a:r>
+              <a:rPr lang="en-US" sz="1400" dirty="0">
+                <a:latin typeface="Arial" panose="020B0604020202020204" pitchFamily="34" charset="0"/>
+                <a:cs typeface="Arial" panose="020B0604020202020204" pitchFamily="34" charset="0"/>
+              </a:rPr>
+              <a:t> </a:t>
+            </a:r>
+            <a:r>
+              <a:rPr lang="en-US" sz="1400" dirty="0" err="1">
+                <a:latin typeface="Arial" panose="020B0604020202020204" pitchFamily="34" charset="0"/>
+                <a:cs typeface="Arial" panose="020B0604020202020204" pitchFamily="34" charset="0"/>
+              </a:rPr>
+              <a:t>và</a:t>
+            </a:r>
+            <a:r>
+              <a:rPr lang="en-US" sz="1400" dirty="0">
+                <a:latin typeface="Arial" panose="020B0604020202020204" pitchFamily="34" charset="0"/>
+                <a:cs typeface="Arial" panose="020B0604020202020204" pitchFamily="34" charset="0"/>
+              </a:rPr>
+              <a:t> </a:t>
+            </a:r>
+            <a:r>
+              <a:rPr lang="en-US" sz="1400" dirty="0" err="1">
+                <a:latin typeface="Arial" panose="020B0604020202020204" pitchFamily="34" charset="0"/>
+                <a:cs typeface="Arial" panose="020B0604020202020204" pitchFamily="34" charset="0"/>
+              </a:rPr>
+              <a:t>thực</a:t>
+            </a:r>
+            <a:r>
+              <a:rPr lang="en-US" sz="1400" dirty="0">
+                <a:latin typeface="Arial" panose="020B0604020202020204" pitchFamily="34" charset="0"/>
+                <a:cs typeface="Arial" panose="020B0604020202020204" pitchFamily="34" charset="0"/>
+              </a:rPr>
+              <a:t> </a:t>
+            </a:r>
+            <a:r>
+              <a:rPr lang="en-US" sz="1400" dirty="0" err="1">
+                <a:latin typeface="Arial" panose="020B0604020202020204" pitchFamily="34" charset="0"/>
+                <a:cs typeface="Arial" panose="020B0604020202020204" pitchFamily="34" charset="0"/>
+              </a:rPr>
+              <a:t>hiện</a:t>
+            </a:r>
+            <a:r>
+              <a:rPr lang="en-US" sz="1400" dirty="0">
+                <a:latin typeface="Arial" panose="020B0604020202020204" pitchFamily="34" charset="0"/>
+                <a:cs typeface="Arial" panose="020B0604020202020204" pitchFamily="34" charset="0"/>
+              </a:rPr>
+              <a:t> </a:t>
+            </a:r>
+            <a:r>
+              <a:rPr lang="en-US" sz="1400" dirty="0" err="1">
+                <a:latin typeface="Arial" panose="020B0604020202020204" pitchFamily="34" charset="0"/>
+                <a:cs typeface="Arial" panose="020B0604020202020204" pitchFamily="34" charset="0"/>
+              </a:rPr>
               <a:t>kiểm</a:t>
             </a:r>
             <a:r>
@@ -10827,7 +11034,7 @@
                 <a:latin typeface="Arial" panose="020B0604020202020204" pitchFamily="34" charset="0"/>
                 <a:cs typeface="Arial" panose="020B0604020202020204" pitchFamily="34" charset="0"/>
               </a:rPr>
-              <a:t>toàn</a:t>
+              <a:t>cho</a:t>
             </a:r>
             <a:r>
               <a:rPr lang="en-US" sz="1400" dirty="0">
@@ -10841,7 +11048,7 @@
                 <a:latin typeface="Arial" panose="020B0604020202020204" pitchFamily="34" charset="0"/>
                 <a:cs typeface="Arial" panose="020B0604020202020204" pitchFamily="34" charset="0"/>
               </a:rPr>
-              <a:t>diện</a:t>
+              <a:t>các</a:t>
             </a:r>
             <a:r>
               <a:rPr lang="en-US" sz="1400" dirty="0">
@@ -10855,7 +11062,7 @@
                 <a:latin typeface="Arial" panose="020B0604020202020204" pitchFamily="34" charset="0"/>
                 <a:cs typeface="Arial" panose="020B0604020202020204" pitchFamily="34" charset="0"/>
               </a:rPr>
-              <a:t>hệ</a:t>
+              <a:t>chức</a:t>
             </a:r>
             <a:r>
               <a:rPr lang="en-US" sz="1400" dirty="0">
@@ -10869,7 +11076,7 @@
                 <a:latin typeface="Arial" panose="020B0604020202020204" pitchFamily="34" charset="0"/>
                 <a:cs typeface="Arial" panose="020B0604020202020204" pitchFamily="34" charset="0"/>
               </a:rPr>
-              <a:t>thống</a:t>
+              <a:t>năng</a:t>
             </a:r>
             <a:r>
               <a:rPr lang="en-US" sz="1400" dirty="0">
@@ -10883,147 +11090,7 @@
                 <a:latin typeface="Arial" panose="020B0604020202020204" pitchFamily="34" charset="0"/>
                 <a:cs typeface="Arial" panose="020B0604020202020204" pitchFamily="34" charset="0"/>
               </a:rPr>
-              <a:t>để</a:t>
-            </a:r>
-            <a:r>
-              <a:rPr lang="en-US" sz="1400" dirty="0">
-                <a:latin typeface="Arial" panose="020B0604020202020204" pitchFamily="34" charset="0"/>
-                <a:cs typeface="Arial" panose="020B0604020202020204" pitchFamily="34" charset="0"/>
-              </a:rPr>
-              <a:t> </a:t>
-            </a:r>
-            <a:r>
-              <a:rPr lang="en-US" sz="1400" dirty="0" err="1">
-                <a:latin typeface="Arial" panose="020B0604020202020204" pitchFamily="34" charset="0"/>
-                <a:cs typeface="Arial" panose="020B0604020202020204" pitchFamily="34" charset="0"/>
-              </a:rPr>
-              <a:t>phát</a:t>
-            </a:r>
-            <a:r>
-              <a:rPr lang="en-US" sz="1400" dirty="0">
-                <a:latin typeface="Arial" panose="020B0604020202020204" pitchFamily="34" charset="0"/>
-                <a:cs typeface="Arial" panose="020B0604020202020204" pitchFamily="34" charset="0"/>
-              </a:rPr>
-              <a:t> </a:t>
-            </a:r>
-            <a:r>
-              <a:rPr lang="en-US" sz="1400" dirty="0" err="1">
-                <a:latin typeface="Arial" panose="020B0604020202020204" pitchFamily="34" charset="0"/>
-                <a:cs typeface="Arial" panose="020B0604020202020204" pitchFamily="34" charset="0"/>
-              </a:rPr>
-              <a:t>hiện</a:t>
-            </a:r>
-            <a:r>
-              <a:rPr lang="en-US" sz="1400" dirty="0">
-                <a:latin typeface="Arial" panose="020B0604020202020204" pitchFamily="34" charset="0"/>
-                <a:cs typeface="Arial" panose="020B0604020202020204" pitchFamily="34" charset="0"/>
-              </a:rPr>
-              <a:t> </a:t>
-            </a:r>
-            <a:r>
-              <a:rPr lang="en-US" sz="1400" dirty="0" err="1">
-                <a:latin typeface="Arial" panose="020B0604020202020204" pitchFamily="34" charset="0"/>
-                <a:cs typeface="Arial" panose="020B0604020202020204" pitchFamily="34" charset="0"/>
-              </a:rPr>
-              <a:t>và</a:t>
-            </a:r>
-            <a:r>
-              <a:rPr lang="en-US" sz="1400" dirty="0">
-                <a:latin typeface="Arial" panose="020B0604020202020204" pitchFamily="34" charset="0"/>
-                <a:cs typeface="Arial" panose="020B0604020202020204" pitchFamily="34" charset="0"/>
-              </a:rPr>
-              <a:t> </a:t>
-            </a:r>
-            <a:r>
-              <a:rPr lang="en-US" sz="1400" dirty="0" err="1">
-                <a:latin typeface="Arial" panose="020B0604020202020204" pitchFamily="34" charset="0"/>
-                <a:cs typeface="Arial" panose="020B0604020202020204" pitchFamily="34" charset="0"/>
-              </a:rPr>
-              <a:t>khắc</a:t>
-            </a:r>
-            <a:r>
-              <a:rPr lang="en-US" sz="1400" dirty="0">
-                <a:latin typeface="Arial" panose="020B0604020202020204" pitchFamily="34" charset="0"/>
-                <a:cs typeface="Arial" panose="020B0604020202020204" pitchFamily="34" charset="0"/>
-              </a:rPr>
-              <a:t> </a:t>
-            </a:r>
-            <a:r>
-              <a:rPr lang="en-US" sz="1400" dirty="0" err="1">
-                <a:latin typeface="Arial" panose="020B0604020202020204" pitchFamily="34" charset="0"/>
-                <a:cs typeface="Arial" panose="020B0604020202020204" pitchFamily="34" charset="0"/>
-              </a:rPr>
-              <a:t>phục</a:t>
-            </a:r>
-            <a:r>
-              <a:rPr lang="en-US" sz="1400" dirty="0">
-                <a:latin typeface="Arial" panose="020B0604020202020204" pitchFamily="34" charset="0"/>
-                <a:cs typeface="Arial" panose="020B0604020202020204" pitchFamily="34" charset="0"/>
-              </a:rPr>
-              <a:t> </a:t>
-            </a:r>
-            <a:r>
-              <a:rPr lang="en-US" sz="1400" dirty="0" err="1">
-                <a:latin typeface="Arial" panose="020B0604020202020204" pitchFamily="34" charset="0"/>
-                <a:cs typeface="Arial" panose="020B0604020202020204" pitchFamily="34" charset="0"/>
-              </a:rPr>
-              <a:t>các</a:t>
-            </a:r>
-            <a:r>
-              <a:rPr lang="en-US" sz="1400" dirty="0">
-                <a:latin typeface="Arial" panose="020B0604020202020204" pitchFamily="34" charset="0"/>
-                <a:cs typeface="Arial" panose="020B0604020202020204" pitchFamily="34" charset="0"/>
-              </a:rPr>
-              <a:t> </a:t>
-            </a:r>
-            <a:r>
-              <a:rPr lang="en-US" sz="1400" dirty="0" err="1">
-                <a:latin typeface="Arial" panose="020B0604020202020204" pitchFamily="34" charset="0"/>
-                <a:cs typeface="Arial" panose="020B0604020202020204" pitchFamily="34" charset="0"/>
-              </a:rPr>
-              <a:t>lỗi</a:t>
-            </a:r>
-            <a:r>
-              <a:rPr lang="en-US" sz="1400" dirty="0">
-                <a:latin typeface="Arial" panose="020B0604020202020204" pitchFamily="34" charset="0"/>
-                <a:cs typeface="Arial" panose="020B0604020202020204" pitchFamily="34" charset="0"/>
-              </a:rPr>
-              <a:t> </a:t>
-            </a:r>
-            <a:r>
-              <a:rPr lang="en-US" sz="1400" dirty="0" err="1">
-                <a:latin typeface="Arial" panose="020B0604020202020204" pitchFamily="34" charset="0"/>
-                <a:cs typeface="Arial" panose="020B0604020202020204" pitchFamily="34" charset="0"/>
-              </a:rPr>
-              <a:t>còn</a:t>
-            </a:r>
-            <a:r>
-              <a:rPr lang="en-US" sz="1400" dirty="0">
-                <a:latin typeface="Arial" panose="020B0604020202020204" pitchFamily="34" charset="0"/>
-                <a:cs typeface="Arial" panose="020B0604020202020204" pitchFamily="34" charset="0"/>
-              </a:rPr>
-              <a:t> </a:t>
-            </a:r>
-            <a:r>
-              <a:rPr lang="en-US" sz="1400" dirty="0" err="1">
-                <a:latin typeface="Arial" panose="020B0604020202020204" pitchFamily="34" charset="0"/>
-                <a:cs typeface="Arial" panose="020B0604020202020204" pitchFamily="34" charset="0"/>
-              </a:rPr>
-              <a:t>tồn</a:t>
-            </a:r>
-            <a:r>
-              <a:rPr lang="en-US" sz="1400" dirty="0">
-                <a:latin typeface="Arial" panose="020B0604020202020204" pitchFamily="34" charset="0"/>
-                <a:cs typeface="Arial" panose="020B0604020202020204" pitchFamily="34" charset="0"/>
-              </a:rPr>
-              <a:t> </a:t>
-            </a:r>
-            <a:r>
-              <a:rPr lang="en-US" sz="1400" dirty="0" err="1">
-                <a:latin typeface="Arial" panose="020B0604020202020204" pitchFamily="34" charset="0"/>
-                <a:cs typeface="Arial" panose="020B0604020202020204" pitchFamily="34" charset="0"/>
-              </a:rPr>
-              <a:t>tại</a:t>
+              <a:t>mới</a:t>
             </a:r>
             <a:r>
               <a:rPr lang="en-US" sz="1400" dirty="0">

</xml_diff>